<commit_message>
Add ReadMe.md with GitHub best practices for HMIS
</commit_message>
<xml_diff>
--- a/git_best_practices_presentation.pptx
+++ b/git_best_practices_presentation.pptx
@@ -6,15 +6,6 @@
   </p:sldMasterIdLst>
   <p:sldIdLst>
     <p:sldId id="256" r:id="rId2"/>
-    <p:sldId id="257" r:id="rId3"/>
-    <p:sldId id="258" r:id="rId4"/>
-    <p:sldId id="259" r:id="rId5"/>
-    <p:sldId id="260" r:id="rId6"/>
-    <p:sldId id="261" r:id="rId7"/>
-    <p:sldId id="262" r:id="rId8"/>
-    <p:sldId id="263" r:id="rId9"/>
-    <p:sldId id="264" r:id="rId10"/>
-    <p:sldId id="265" r:id="rId11"/>
   </p:sldIdLst>
   <p:sldSz cx="9144000" cy="6858000" type="screen4x3"/>
   <p:notesSz cx="6858000" cy="9144000"/>
@@ -3090,856 +3081,60 @@
       </p:grpSpPr>
       <p:sp>
         <p:nvSpPr>
-          <p:cNvPr id="2" name="Title 1"/>
-          <p:cNvSpPr>
-            <a:spLocks noGrp="1"/>
-          </p:cNvSpPr>
-          <p:nvPr>
-            <p:ph type="title"/>
-          </p:nvPr>
-        </p:nvSpPr>
-        <p:spPr/>
-        <p:txBody>
-          <a:bodyPr/>
-          <a:lstStyle/>
-          <a:p>
-            <a:r>
-              <a:t>Introduction to Git</a:t>
-            </a:r>
-          </a:p>
-        </p:txBody>
-      </p:sp>
-      <p:sp>
-        <p:nvSpPr>
-          <p:cNvPr id="3" name="Content Placeholder 2"/>
-          <p:cNvSpPr>
-            <a:spLocks noGrp="1"/>
-          </p:cNvSpPr>
-          <p:nvPr>
-            <p:ph idx="1"/>
-          </p:nvPr>
-        </p:nvSpPr>
-        <p:spPr/>
-        <p:txBody>
-          <a:bodyPr/>
-          <a:lstStyle/>
-          <a:p>
-            <a:pPr>
-              <a:defRPr sz="1400"/>
-            </a:pPr>
-            <a:r>
-              <a:t>• Brief history and importance of Git</a:t>
-            </a:r>
-          </a:p>
-          <a:p>
-            <a:pPr>
-              <a:defRPr sz="1400"/>
-            </a:pPr>
-            <a:r>
-              <a:t>• Key terminology: repository, commit, branch, merge</a:t>
-            </a:r>
-          </a:p>
-          <a:p>
-            <a:pPr>
-              <a:defRPr sz="1400"/>
-            </a:pPr>
-            <a:r>
-              <a:t>• Distributed version control system overview</a:t>
-            </a:r>
+          <p:cNvPr id="2" name="Title 1">
+            <a:extLst>
+              <a:ext uri="{FF2B5EF4-FFF2-40B4-BE49-F238E27FC236}">
+                <a16:creationId xmlns:a16="http://schemas.microsoft.com/office/drawing/2014/main" id="{7628E472-320B-A616-D932-F4D44549A50C}"/>
+              </a:ext>
+            </a:extLst>
+          </p:cNvPr>
+          <p:cNvSpPr>
+            <a:spLocks noGrp="1"/>
+          </p:cNvSpPr>
+          <p:nvPr>
+            <p:ph type="ctrTitle"/>
+          </p:nvPr>
+        </p:nvSpPr>
+        <p:spPr/>
+        <p:txBody>
+          <a:bodyPr/>
+          <a:lstStyle/>
+          <a:p>
+            <a:endParaRPr lang="en-US"/>
+          </a:p>
+        </p:txBody>
+      </p:sp>
+      <p:sp>
+        <p:nvSpPr>
+          <p:cNvPr id="3" name="Subtitle 2">
+            <a:extLst>
+              <a:ext uri="{FF2B5EF4-FFF2-40B4-BE49-F238E27FC236}">
+                <a16:creationId xmlns:a16="http://schemas.microsoft.com/office/drawing/2014/main" id="{BE93A097-A08C-A553-DE3C-0A62D2112C91}"/>
+              </a:ext>
+            </a:extLst>
+          </p:cNvPr>
+          <p:cNvSpPr>
+            <a:spLocks noGrp="1"/>
+          </p:cNvSpPr>
+          <p:nvPr>
+            <p:ph type="subTitle" idx="1"/>
+          </p:nvPr>
+        </p:nvSpPr>
+        <p:spPr/>
+        <p:txBody>
+          <a:bodyPr/>
+          <a:lstStyle/>
+          <a:p>
+            <a:endParaRPr lang="en-US"/>
           </a:p>
         </p:txBody>
       </p:sp>
     </p:spTree>
-  </p:cSld>
-  <p:clrMapOvr>
-    <a:masterClrMapping/>
-  </p:clrMapOvr>
-</p:sld>
-</file>
-
-<file path=ppt/slides/slide10.xml><?xml version="1.0" encoding="utf-8"?>
-<p:sld xmlns:a="http://schemas.openxmlformats.org/drawingml/2006/main" xmlns:r="http://schemas.openxmlformats.org/officeDocument/2006/relationships" xmlns:p="http://schemas.openxmlformats.org/presentationml/2006/main">
-  <p:cSld>
-    <p:spTree>
-      <p:nvGrpSpPr>
-        <p:cNvPr id="1" name=""/>
-        <p:cNvGrpSpPr/>
-        <p:nvPr/>
-      </p:nvGrpSpPr>
-      <p:grpSpPr>
-        <a:xfrm>
-          <a:off x="0" y="0"/>
-          <a:ext cx="0" cy="0"/>
-          <a:chOff x="0" y="0"/>
-          <a:chExt cx="0" cy="0"/>
-        </a:xfrm>
-      </p:grpSpPr>
-      <p:sp>
-        <p:nvSpPr>
-          <p:cNvPr id="2" name="Title 1"/>
-          <p:cNvSpPr>
-            <a:spLocks noGrp="1"/>
-          </p:cNvSpPr>
-          <p:nvPr>
-            <p:ph type="title"/>
-          </p:nvPr>
-        </p:nvSpPr>
-        <p:spPr/>
-        <p:txBody>
-          <a:bodyPr/>
-          <a:lstStyle/>
-          <a:p>
-            <a:r>
-              <a:t>Conclusion</a:t>
-            </a:r>
-          </a:p>
-        </p:txBody>
-      </p:sp>
-      <p:sp>
-        <p:nvSpPr>
-          <p:cNvPr id="3" name="Content Placeholder 2"/>
-          <p:cNvSpPr>
-            <a:spLocks noGrp="1"/>
-          </p:cNvSpPr>
-          <p:nvPr>
-            <p:ph idx="1"/>
-          </p:nvPr>
-        </p:nvSpPr>
-        <p:spPr/>
-        <p:txBody>
-          <a:bodyPr/>
-          <a:lstStyle/>
-          <a:p>
-            <a:pPr>
-              <a:defRPr sz="1400"/>
-            </a:pPr>
-            <a:r>
-              <a:t>• Recap of key points</a:t>
-            </a:r>
-          </a:p>
-          <a:p>
-            <a:pPr>
-              <a:defRPr sz="1400"/>
-            </a:pPr>
-            <a:r>
-              <a:t>• Importance of consistent practices</a:t>
-            </a:r>
-          </a:p>
-          <a:p>
-            <a:pPr>
-              <a:defRPr sz="1400"/>
-            </a:pPr>
-            <a:r>
-              <a:t>• Resources for further learning</a:t>
-            </a:r>
-          </a:p>
-        </p:txBody>
-      </p:sp>
-    </p:spTree>
-  </p:cSld>
-  <p:clrMapOvr>
-    <a:masterClrMapping/>
-  </p:clrMapOvr>
-</p:sld>
-</file>
-
-<file path=ppt/slides/slide2.xml><?xml version="1.0" encoding="utf-8"?>
-<p:sld xmlns:a="http://schemas.openxmlformats.org/drawingml/2006/main" xmlns:r="http://schemas.openxmlformats.org/officeDocument/2006/relationships" xmlns:p="http://schemas.openxmlformats.org/presentationml/2006/main">
-  <p:cSld>
-    <p:spTree>
-      <p:nvGrpSpPr>
-        <p:cNvPr id="1" name=""/>
-        <p:cNvGrpSpPr/>
-        <p:nvPr/>
-      </p:nvGrpSpPr>
-      <p:grpSpPr>
-        <a:xfrm>
-          <a:off x="0" y="0"/>
-          <a:ext cx="0" cy="0"/>
-          <a:chOff x="0" y="0"/>
-          <a:chExt cx="0" cy="0"/>
-        </a:xfrm>
-      </p:grpSpPr>
-      <p:sp>
-        <p:nvSpPr>
-          <p:cNvPr id="2" name="Title 1"/>
-          <p:cNvSpPr>
-            <a:spLocks noGrp="1"/>
-          </p:cNvSpPr>
-          <p:nvPr>
-            <p:ph type="title"/>
-          </p:nvPr>
-        </p:nvSpPr>
-        <p:spPr/>
-        <p:txBody>
-          <a:bodyPr/>
-          <a:lstStyle/>
-          <a:p>
-            <a:r>
-              <a:t>Setting Up Git</a:t>
-            </a:r>
-          </a:p>
-        </p:txBody>
-      </p:sp>
-      <p:sp>
-        <p:nvSpPr>
-          <p:cNvPr id="3" name="Content Placeholder 2"/>
-          <p:cNvSpPr>
-            <a:spLocks noGrp="1"/>
-          </p:cNvSpPr>
-          <p:nvPr>
-            <p:ph idx="1"/>
-          </p:nvPr>
-        </p:nvSpPr>
-        <p:spPr/>
-        <p:txBody>
-          <a:bodyPr/>
-          <a:lstStyle/>
-          <a:p>
-            <a:pPr>
-              <a:defRPr sz="1400"/>
-            </a:pPr>
-            <a:r>
-              <a:t>• Installing Git</a:t>
-            </a:r>
-          </a:p>
-          <a:p>
-            <a:pPr>
-              <a:defRPr sz="1400"/>
-            </a:pPr>
-            <a:r>
-              <a:t>• Configuring user information (name and email)</a:t>
-            </a:r>
-          </a:p>
-          <a:p>
-            <a:pPr>
-              <a:defRPr sz="1400"/>
-            </a:pPr>
-            <a:r>
-              <a:t>• Creating and cloning repositories</a:t>
-            </a:r>
-          </a:p>
-        </p:txBody>
-      </p:sp>
-    </p:spTree>
-  </p:cSld>
-  <p:clrMapOvr>
-    <a:masterClrMapping/>
-  </p:clrMapOvr>
-</p:sld>
-</file>
-
-<file path=ppt/slides/slide3.xml><?xml version="1.0" encoding="utf-8"?>
-<p:sld xmlns:a="http://schemas.openxmlformats.org/drawingml/2006/main" xmlns:r="http://schemas.openxmlformats.org/officeDocument/2006/relationships" xmlns:p="http://schemas.openxmlformats.org/presentationml/2006/main">
-  <p:cSld>
-    <p:spTree>
-      <p:nvGrpSpPr>
-        <p:cNvPr id="1" name=""/>
-        <p:cNvGrpSpPr/>
-        <p:nvPr/>
-      </p:nvGrpSpPr>
-      <p:grpSpPr>
-        <a:xfrm>
-          <a:off x="0" y="0"/>
-          <a:ext cx="0" cy="0"/>
-          <a:chOff x="0" y="0"/>
-          <a:chExt cx="0" cy="0"/>
-        </a:xfrm>
-      </p:grpSpPr>
-      <p:sp>
-        <p:nvSpPr>
-          <p:cNvPr id="2" name="Title 1"/>
-          <p:cNvSpPr>
-            <a:spLocks noGrp="1"/>
-          </p:cNvSpPr>
-          <p:nvPr>
-            <p:ph type="title"/>
-          </p:nvPr>
-        </p:nvSpPr>
-        <p:spPr/>
-        <p:txBody>
-          <a:bodyPr/>
-          <a:lstStyle/>
-          <a:p>
-            <a:r>
-              <a:t>Basic Git Commands</a:t>
-            </a:r>
-          </a:p>
-        </p:txBody>
-      </p:sp>
-      <p:sp>
-        <p:nvSpPr>
-          <p:cNvPr id="3" name="Content Placeholder 2"/>
-          <p:cNvSpPr>
-            <a:spLocks noGrp="1"/>
-          </p:cNvSpPr>
-          <p:nvPr>
-            <p:ph idx="1"/>
-          </p:nvPr>
-        </p:nvSpPr>
-        <p:spPr/>
-        <p:txBody>
-          <a:bodyPr/>
-          <a:lstStyle/>
-          <a:p>
-            <a:pPr>
-              <a:defRPr sz="1400"/>
-            </a:pPr>
-            <a:r>
-              <a:t>• git init</a:t>
-            </a:r>
-          </a:p>
-          <a:p>
-            <a:pPr>
-              <a:defRPr sz="1400"/>
-            </a:pPr>
-            <a:r>
-              <a:t>• git add</a:t>
-            </a:r>
-          </a:p>
-          <a:p>
-            <a:pPr>
-              <a:defRPr sz="1400"/>
-            </a:pPr>
-            <a:r>
-              <a:t>• git commit</a:t>
-            </a:r>
-          </a:p>
-          <a:p>
-            <a:pPr>
-              <a:defRPr sz="1400"/>
-            </a:pPr>
-            <a:r>
-              <a:t>• git push</a:t>
-            </a:r>
-          </a:p>
-          <a:p>
-            <a:pPr>
-              <a:defRPr sz="1400"/>
-            </a:pPr>
-            <a:r>
-              <a:t>• git pull</a:t>
-            </a:r>
-          </a:p>
-        </p:txBody>
-      </p:sp>
-    </p:spTree>
-  </p:cSld>
-  <p:clrMapOvr>
-    <a:masterClrMapping/>
-  </p:clrMapOvr>
-</p:sld>
-</file>
-
-<file path=ppt/slides/slide4.xml><?xml version="1.0" encoding="utf-8"?>
-<p:sld xmlns:a="http://schemas.openxmlformats.org/drawingml/2006/main" xmlns:r="http://schemas.openxmlformats.org/officeDocument/2006/relationships" xmlns:p="http://schemas.openxmlformats.org/presentationml/2006/main">
-  <p:cSld>
-    <p:spTree>
-      <p:nvGrpSpPr>
-        <p:cNvPr id="1" name=""/>
-        <p:cNvGrpSpPr/>
-        <p:nvPr/>
-      </p:nvGrpSpPr>
-      <p:grpSpPr>
-        <a:xfrm>
-          <a:off x="0" y="0"/>
-          <a:ext cx="0" cy="0"/>
-          <a:chOff x="0" y="0"/>
-          <a:chExt cx="0" cy="0"/>
-        </a:xfrm>
-      </p:grpSpPr>
-      <p:sp>
-        <p:nvSpPr>
-          <p:cNvPr id="2" name="Title 1"/>
-          <p:cNvSpPr>
-            <a:spLocks noGrp="1"/>
-          </p:cNvSpPr>
-          <p:nvPr>
-            <p:ph type="title"/>
-          </p:nvPr>
-        </p:nvSpPr>
-        <p:spPr/>
-        <p:txBody>
-          <a:bodyPr/>
-          <a:lstStyle/>
-          <a:p>
-            <a:r>
-              <a:t>Branching and Merging</a:t>
-            </a:r>
-          </a:p>
-        </p:txBody>
-      </p:sp>
-      <p:sp>
-        <p:nvSpPr>
-          <p:cNvPr id="3" name="Content Placeholder 2"/>
-          <p:cNvSpPr>
-            <a:spLocks noGrp="1"/>
-          </p:cNvSpPr>
-          <p:nvPr>
-            <p:ph idx="1"/>
-          </p:nvPr>
-        </p:nvSpPr>
-        <p:spPr/>
-        <p:txBody>
-          <a:bodyPr/>
-          <a:lstStyle/>
-          <a:p>
-            <a:pPr>
-              <a:defRPr sz="1400"/>
-            </a:pPr>
-            <a:r>
-              <a:t>• Creating branches: git branch</a:t>
-            </a:r>
-          </a:p>
-          <a:p>
-            <a:pPr>
-              <a:defRPr sz="1400"/>
-            </a:pPr>
-            <a:r>
-              <a:t>• Switching branches: git checkout/git switch</a:t>
-            </a:r>
-          </a:p>
-          <a:p>
-            <a:pPr>
-              <a:defRPr sz="1400"/>
-            </a:pPr>
-            <a:r>
-              <a:t>• Merging branches: git merge</a:t>
-            </a:r>
-          </a:p>
-        </p:txBody>
-      </p:sp>
-    </p:spTree>
-  </p:cSld>
-  <p:clrMapOvr>
-    <a:masterClrMapping/>
-  </p:clrMapOvr>
-</p:sld>
-</file>
-
-<file path=ppt/slides/slide5.xml><?xml version="1.0" encoding="utf-8"?>
-<p:sld xmlns:a="http://schemas.openxmlformats.org/drawingml/2006/main" xmlns:r="http://schemas.openxmlformats.org/officeDocument/2006/relationships" xmlns:p="http://schemas.openxmlformats.org/presentationml/2006/main">
-  <p:cSld>
-    <p:spTree>
-      <p:nvGrpSpPr>
-        <p:cNvPr id="1" name=""/>
-        <p:cNvGrpSpPr/>
-        <p:nvPr/>
-      </p:nvGrpSpPr>
-      <p:grpSpPr>
-        <a:xfrm>
-          <a:off x="0" y="0"/>
-          <a:ext cx="0" cy="0"/>
-          <a:chOff x="0" y="0"/>
-          <a:chExt cx="0" cy="0"/>
-        </a:xfrm>
-      </p:grpSpPr>
-      <p:sp>
-        <p:nvSpPr>
-          <p:cNvPr id="2" name="Title 1"/>
-          <p:cNvSpPr>
-            <a:spLocks noGrp="1"/>
-          </p:cNvSpPr>
-          <p:nvPr>
-            <p:ph type="title"/>
-          </p:nvPr>
-        </p:nvSpPr>
-        <p:spPr/>
-        <p:txBody>
-          <a:bodyPr/>
-          <a:lstStyle/>
-          <a:p>
-            <a:r>
-              <a:t>Best Practices</a:t>
-            </a:r>
-          </a:p>
-        </p:txBody>
-      </p:sp>
-      <p:sp>
-        <p:nvSpPr>
-          <p:cNvPr id="3" name="Content Placeholder 2"/>
-          <p:cNvSpPr>
-            <a:spLocks noGrp="1"/>
-          </p:cNvSpPr>
-          <p:nvPr>
-            <p:ph idx="1"/>
-          </p:nvPr>
-        </p:nvSpPr>
-        <p:spPr/>
-        <p:txBody>
-          <a:bodyPr/>
-          <a:lstStyle/>
-          <a:p>
-            <a:pPr>
-              <a:defRPr sz="1400"/>
-            </a:pPr>
-            <a:r>
-              <a:t>• Commit frequently with meaningful messages</a:t>
-            </a:r>
-          </a:p>
-          <a:p>
-            <a:pPr>
-              <a:defRPr sz="1400"/>
-            </a:pPr>
-            <a:r>
-              <a:t>• Use feature branches for new changes</a:t>
-            </a:r>
-          </a:p>
-          <a:p>
-            <a:pPr>
-              <a:defRPr sz="1400"/>
-            </a:pPr>
-            <a:r>
-              <a:t>• Code reviews and pull requests</a:t>
-            </a:r>
-          </a:p>
-        </p:txBody>
-      </p:sp>
-    </p:spTree>
-  </p:cSld>
-  <p:clrMapOvr>
-    <a:masterClrMapping/>
-  </p:clrMapOvr>
-</p:sld>
-</file>
-
-<file path=ppt/slides/slide6.xml><?xml version="1.0" encoding="utf-8"?>
-<p:sld xmlns:a="http://schemas.openxmlformats.org/drawingml/2006/main" xmlns:r="http://schemas.openxmlformats.org/officeDocument/2006/relationships" xmlns:p="http://schemas.openxmlformats.org/presentationml/2006/main">
-  <p:cSld>
-    <p:spTree>
-      <p:nvGrpSpPr>
-        <p:cNvPr id="1" name=""/>
-        <p:cNvGrpSpPr/>
-        <p:nvPr/>
-      </p:nvGrpSpPr>
-      <p:grpSpPr>
-        <a:xfrm>
-          <a:off x="0" y="0"/>
-          <a:ext cx="0" cy="0"/>
-          <a:chOff x="0" y="0"/>
-          <a:chExt cx="0" cy="0"/>
-        </a:xfrm>
-      </p:grpSpPr>
-      <p:sp>
-        <p:nvSpPr>
-          <p:cNvPr id="2" name="Title 1"/>
-          <p:cNvSpPr>
-            <a:spLocks noGrp="1"/>
-          </p:cNvSpPr>
-          <p:nvPr>
-            <p:ph type="title"/>
-          </p:nvPr>
-        </p:nvSpPr>
-        <p:spPr/>
-        <p:txBody>
-          <a:bodyPr/>
-          <a:lstStyle/>
-          <a:p>
-            <a:r>
-              <a:t>Git Workflows</a:t>
-            </a:r>
-          </a:p>
-        </p:txBody>
-      </p:sp>
-      <p:sp>
-        <p:nvSpPr>
-          <p:cNvPr id="3" name="Content Placeholder 2"/>
-          <p:cNvSpPr>
-            <a:spLocks noGrp="1"/>
-          </p:cNvSpPr>
-          <p:nvPr>
-            <p:ph idx="1"/>
-          </p:nvPr>
-        </p:nvSpPr>
-        <p:spPr/>
-        <p:txBody>
-          <a:bodyPr/>
-          <a:lstStyle/>
-          <a:p>
-            <a:pPr>
-              <a:defRPr sz="1400"/>
-            </a:pPr>
-            <a:r>
-              <a:t>• Centralized workflow</a:t>
-            </a:r>
-          </a:p>
-          <a:p>
-            <a:pPr>
-              <a:defRPr sz="1400"/>
-            </a:pPr>
-            <a:r>
-              <a:t>• Feature branch workflow</a:t>
-            </a:r>
-          </a:p>
-          <a:p>
-            <a:pPr>
-              <a:defRPr sz="1400"/>
-            </a:pPr>
-            <a:r>
-              <a:t>• Gitflow workflow</a:t>
-            </a:r>
-          </a:p>
-        </p:txBody>
-      </p:sp>
-    </p:spTree>
-  </p:cSld>
-  <p:clrMapOvr>
-    <a:masterClrMapping/>
-  </p:clrMapOvr>
-</p:sld>
-</file>
-
-<file path=ppt/slides/slide7.xml><?xml version="1.0" encoding="utf-8"?>
-<p:sld xmlns:a="http://schemas.openxmlformats.org/drawingml/2006/main" xmlns:r="http://schemas.openxmlformats.org/officeDocument/2006/relationships" xmlns:p="http://schemas.openxmlformats.org/presentationml/2006/main">
-  <p:cSld>
-    <p:spTree>
-      <p:nvGrpSpPr>
-        <p:cNvPr id="1" name=""/>
-        <p:cNvGrpSpPr/>
-        <p:nvPr/>
-      </p:nvGrpSpPr>
-      <p:grpSpPr>
-        <a:xfrm>
-          <a:off x="0" y="0"/>
-          <a:ext cx="0" cy="0"/>
-          <a:chOff x="0" y="0"/>
-          <a:chExt cx="0" cy="0"/>
-        </a:xfrm>
-      </p:grpSpPr>
-      <p:sp>
-        <p:nvSpPr>
-          <p:cNvPr id="2" name="Title 1"/>
-          <p:cNvSpPr>
-            <a:spLocks noGrp="1"/>
-          </p:cNvSpPr>
-          <p:nvPr>
-            <p:ph type="title"/>
-          </p:nvPr>
-        </p:nvSpPr>
-        <p:spPr/>
-        <p:txBody>
-          <a:bodyPr/>
-          <a:lstStyle/>
-          <a:p>
-            <a:r>
-              <a:t>Handling Conflicts</a:t>
-            </a:r>
-          </a:p>
-        </p:txBody>
-      </p:sp>
-      <p:sp>
-        <p:nvSpPr>
-          <p:cNvPr id="3" name="Content Placeholder 2"/>
-          <p:cNvSpPr>
-            <a:spLocks noGrp="1"/>
-          </p:cNvSpPr>
-          <p:nvPr>
-            <p:ph idx="1"/>
-          </p:nvPr>
-        </p:nvSpPr>
-        <p:spPr/>
-        <p:txBody>
-          <a:bodyPr/>
-          <a:lstStyle/>
-          <a:p>
-            <a:pPr>
-              <a:defRPr sz="1400"/>
-            </a:pPr>
-            <a:r>
-              <a:t>• Identifying conflicts</a:t>
-            </a:r>
-          </a:p>
-          <a:p>
-            <a:pPr>
-              <a:defRPr sz="1400"/>
-            </a:pPr>
-            <a:r>
-              <a:t>• Resolving merge conflicts</a:t>
-            </a:r>
-          </a:p>
-          <a:p>
-            <a:pPr>
-              <a:defRPr sz="1400"/>
-            </a:pPr>
-            <a:r>
-              <a:t>• Rebase vs Merge</a:t>
-            </a:r>
-          </a:p>
-        </p:txBody>
-      </p:sp>
-    </p:spTree>
-  </p:cSld>
-  <p:clrMapOvr>
-    <a:masterClrMapping/>
-  </p:clrMapOvr>
-</p:sld>
-</file>
-
-<file path=ppt/slides/slide8.xml><?xml version="1.0" encoding="utf-8"?>
-<p:sld xmlns:a="http://schemas.openxmlformats.org/drawingml/2006/main" xmlns:r="http://schemas.openxmlformats.org/officeDocument/2006/relationships" xmlns:p="http://schemas.openxmlformats.org/presentationml/2006/main">
-  <p:cSld>
-    <p:spTree>
-      <p:nvGrpSpPr>
-        <p:cNvPr id="1" name=""/>
-        <p:cNvGrpSpPr/>
-        <p:nvPr/>
-      </p:nvGrpSpPr>
-      <p:grpSpPr>
-        <a:xfrm>
-          <a:off x="0" y="0"/>
-          <a:ext cx="0" cy="0"/>
-          <a:chOff x="0" y="0"/>
-          <a:chExt cx="0" cy="0"/>
-        </a:xfrm>
-      </p:grpSpPr>
-      <p:sp>
-        <p:nvSpPr>
-          <p:cNvPr id="2" name="Title 1"/>
-          <p:cNvSpPr>
-            <a:spLocks noGrp="1"/>
-          </p:cNvSpPr>
-          <p:nvPr>
-            <p:ph type="title"/>
-          </p:nvPr>
-        </p:nvSpPr>
-        <p:spPr/>
-        <p:txBody>
-          <a:bodyPr/>
-          <a:lstStyle/>
-          <a:p>
-            <a:r>
-              <a:t>Advanced Git Topics</a:t>
-            </a:r>
-          </a:p>
-        </p:txBody>
-      </p:sp>
-      <p:sp>
-        <p:nvSpPr>
-          <p:cNvPr id="3" name="Content Placeholder 2"/>
-          <p:cNvSpPr>
-            <a:spLocks noGrp="1"/>
-          </p:cNvSpPr>
-          <p:nvPr>
-            <p:ph idx="1"/>
-          </p:nvPr>
-        </p:nvSpPr>
-        <p:spPr/>
-        <p:txBody>
-          <a:bodyPr/>
-          <a:lstStyle/>
-          <a:p>
-            <a:pPr>
-              <a:defRPr sz="1400"/>
-            </a:pPr>
-            <a:r>
-              <a:t>• Stashing changes (git stash)</a:t>
-            </a:r>
-          </a:p>
-          <a:p>
-            <a:pPr>
-              <a:defRPr sz="1400"/>
-            </a:pPr>
-            <a:r>
-              <a:t>• Tagging releases</a:t>
-            </a:r>
-          </a:p>
-          <a:p>
-            <a:pPr>
-              <a:defRPr sz="1400"/>
-            </a:pPr>
-            <a:r>
-              <a:t>• Working with submodules</a:t>
-            </a:r>
-          </a:p>
-        </p:txBody>
-      </p:sp>
-    </p:spTree>
-  </p:cSld>
-  <p:clrMapOvr>
-    <a:masterClrMapping/>
-  </p:clrMapOvr>
-</p:sld>
-</file>
-
-<file path=ppt/slides/slide9.xml><?xml version="1.0" encoding="utf-8"?>
-<p:sld xmlns:a="http://schemas.openxmlformats.org/drawingml/2006/main" xmlns:r="http://schemas.openxmlformats.org/officeDocument/2006/relationships" xmlns:p="http://schemas.openxmlformats.org/presentationml/2006/main">
-  <p:cSld>
-    <p:spTree>
-      <p:nvGrpSpPr>
-        <p:cNvPr id="1" name=""/>
-        <p:cNvGrpSpPr/>
-        <p:nvPr/>
-      </p:nvGrpSpPr>
-      <p:grpSpPr>
-        <a:xfrm>
-          <a:off x="0" y="0"/>
-          <a:ext cx="0" cy="0"/>
-          <a:chOff x="0" y="0"/>
-          <a:chExt cx="0" cy="0"/>
-        </a:xfrm>
-      </p:grpSpPr>
-      <p:sp>
-        <p:nvSpPr>
-          <p:cNvPr id="2" name="Title 1"/>
-          <p:cNvSpPr>
-            <a:spLocks noGrp="1"/>
-          </p:cNvSpPr>
-          <p:nvPr>
-            <p:ph type="title"/>
-          </p:nvPr>
-        </p:nvSpPr>
-        <p:spPr/>
-        <p:txBody>
-          <a:bodyPr/>
-          <a:lstStyle/>
-          <a:p>
-            <a:r>
-              <a:t>Tools and Integration</a:t>
-            </a:r>
-          </a:p>
-        </p:txBody>
-      </p:sp>
-      <p:sp>
-        <p:nvSpPr>
-          <p:cNvPr id="3" name="Content Placeholder 2"/>
-          <p:cNvSpPr>
-            <a:spLocks noGrp="1"/>
-          </p:cNvSpPr>
-          <p:nvPr>
-            <p:ph idx="1"/>
-          </p:nvPr>
-        </p:nvSpPr>
-        <p:spPr/>
-        <p:txBody>
-          <a:bodyPr/>
-          <a:lstStyle/>
-          <a:p>
-            <a:pPr>
-              <a:defRPr sz="1400"/>
-            </a:pPr>
-            <a:r>
-              <a:t>• GUI tools for Git</a:t>
-            </a:r>
-          </a:p>
-          <a:p>
-            <a:pPr>
-              <a:defRPr sz="1400"/>
-            </a:pPr>
-            <a:r>
-              <a:t>• IDE integration</a:t>
-            </a:r>
-          </a:p>
-          <a:p>
-            <a:pPr>
-              <a:defRPr sz="1400"/>
-            </a:pPr>
-            <a:r>
-              <a:t>• CI/CD pipelines with Git</a:t>
-            </a:r>
-          </a:p>
-        </p:txBody>
-      </p:sp>
-    </p:spTree>
+    <p:extLst>
+      <p:ext uri="{BB962C8B-B14F-4D97-AF65-F5344CB8AC3E}">
+        <p14:creationId xmlns:p14="http://schemas.microsoft.com/office/powerpoint/2010/main" val="498638265"/>
+      </p:ext>
+    </p:extLst>
   </p:cSld>
   <p:clrMapOvr>
     <a:masterClrMapping/>

</xml_diff>